<commit_message>
new materials, update energy diagram for manual
</commit_message>
<xml_diff>
--- a/doc/tex/images/laser-transitions.pptx
+++ b/doc/tex/images/laser-transitions.pptx
@@ -104,6 +104,22 @@
       </a:defRPr>
     </a:lvl9pPr>
   </p:defaultTextStyle>
+  <p:extLst>
+    <p:ext uri="{EFAFB233-063F-42B5-8137-9DF3F51BA10A}">
+      <p15:sldGuideLst xmlns:p15="http://schemas.microsoft.com/office/powerpoint/2012/main">
+        <p15:guide id="1" orient="horz" pos="1152">
+          <p15:clr>
+            <a:srgbClr val="A4A3A4"/>
+          </p15:clr>
+        </p15:guide>
+        <p15:guide id="2" pos="1296">
+          <p15:clr>
+            <a:srgbClr val="A4A3A4"/>
+          </p15:clr>
+        </p15:guide>
+      </p15:sldGuideLst>
+    </p:ext>
+  </p:extLst>
 </p:presentation>
 </file>
 
@@ -145,10 +161,9 @@
           <a:lstStyle/>
           <a:p>
             <a:r>
-              <a:rPr lang="en-US" smtClean="0"/>
+              <a:rPr lang="en-US"/>
               <a:t>Click to edit Master title style</a:t>
             </a:r>
-            <a:endParaRPr lang="en-US"/>
           </a:p>
         </p:txBody>
       </p:sp>
@@ -264,10 +279,9 @@
           </a:lstStyle>
           <a:p>
             <a:r>
-              <a:rPr lang="en-US" smtClean="0"/>
+              <a:rPr lang="en-US"/>
               <a:t>Click to edit Master subtitle style</a:t>
             </a:r>
-            <a:endParaRPr lang="en-US"/>
           </a:p>
         </p:txBody>
       </p:sp>
@@ -288,7 +302,7 @@
           <a:p>
             <a:fld id="{14FDA196-48ED-4C66-A75B-9C39ECF32E0B}" type="datetimeFigureOut">
               <a:rPr lang="en-US" smtClean="0"/>
-              <a:t>2014-09-17</a:t>
+              <a:t>2021-10-21</a:t>
             </a:fld>
             <a:endParaRPr lang="en-US"/>
           </a:p>
@@ -382,10 +396,9 @@
           <a:lstStyle/>
           <a:p>
             <a:r>
-              <a:rPr lang="en-US" smtClean="0"/>
+              <a:rPr lang="en-US"/>
               <a:t>Click to edit Master title style</a:t>
             </a:r>
-            <a:endParaRPr lang="en-US"/>
           </a:p>
         </p:txBody>
       </p:sp>
@@ -406,38 +419,37 @@
           <a:p>
             <a:pPr lvl="0"/>
             <a:r>
-              <a:rPr lang="en-US" smtClean="0"/>
+              <a:rPr lang="en-US"/>
               <a:t>Click to edit Master text styles</a:t>
             </a:r>
           </a:p>
           <a:p>
             <a:pPr lvl="1"/>
             <a:r>
-              <a:rPr lang="en-US" smtClean="0"/>
+              <a:rPr lang="en-US"/>
               <a:t>Second level</a:t>
             </a:r>
           </a:p>
           <a:p>
             <a:pPr lvl="2"/>
             <a:r>
-              <a:rPr lang="en-US" smtClean="0"/>
+              <a:rPr lang="en-US"/>
               <a:t>Third level</a:t>
             </a:r>
           </a:p>
           <a:p>
             <a:pPr lvl="3"/>
             <a:r>
-              <a:rPr lang="en-US" smtClean="0"/>
+              <a:rPr lang="en-US"/>
               <a:t>Fourth level</a:t>
             </a:r>
           </a:p>
           <a:p>
             <a:pPr lvl="4"/>
             <a:r>
-              <a:rPr lang="en-US" smtClean="0"/>
+              <a:rPr lang="en-US"/>
               <a:t>Fifth level</a:t>
             </a:r>
-            <a:endParaRPr lang="en-US"/>
           </a:p>
         </p:txBody>
       </p:sp>
@@ -458,7 +470,7 @@
           <a:p>
             <a:fld id="{14FDA196-48ED-4C66-A75B-9C39ECF32E0B}" type="datetimeFigureOut">
               <a:rPr lang="en-US" smtClean="0"/>
-              <a:t>2014-09-17</a:t>
+              <a:t>2021-10-21</a:t>
             </a:fld>
             <a:endParaRPr lang="en-US"/>
           </a:p>
@@ -557,10 +569,9 @@
           <a:lstStyle/>
           <a:p>
             <a:r>
-              <a:rPr lang="en-US" smtClean="0"/>
+              <a:rPr lang="en-US"/>
               <a:t>Click to edit Master title style</a:t>
             </a:r>
-            <a:endParaRPr lang="en-US"/>
           </a:p>
         </p:txBody>
       </p:sp>
@@ -586,38 +597,37 @@
           <a:p>
             <a:pPr lvl="0"/>
             <a:r>
-              <a:rPr lang="en-US" smtClean="0"/>
+              <a:rPr lang="en-US"/>
               <a:t>Click to edit Master text styles</a:t>
             </a:r>
           </a:p>
           <a:p>
             <a:pPr lvl="1"/>
             <a:r>
-              <a:rPr lang="en-US" smtClean="0"/>
+              <a:rPr lang="en-US"/>
               <a:t>Second level</a:t>
             </a:r>
           </a:p>
           <a:p>
             <a:pPr lvl="2"/>
             <a:r>
-              <a:rPr lang="en-US" smtClean="0"/>
+              <a:rPr lang="en-US"/>
               <a:t>Third level</a:t>
             </a:r>
           </a:p>
           <a:p>
             <a:pPr lvl="3"/>
             <a:r>
-              <a:rPr lang="en-US" smtClean="0"/>
+              <a:rPr lang="en-US"/>
               <a:t>Fourth level</a:t>
             </a:r>
           </a:p>
           <a:p>
             <a:pPr lvl="4"/>
             <a:r>
-              <a:rPr lang="en-US" smtClean="0"/>
+              <a:rPr lang="en-US"/>
               <a:t>Fifth level</a:t>
             </a:r>
-            <a:endParaRPr lang="en-US"/>
           </a:p>
         </p:txBody>
       </p:sp>
@@ -638,7 +648,7 @@
           <a:p>
             <a:fld id="{14FDA196-48ED-4C66-A75B-9C39ECF32E0B}" type="datetimeFigureOut">
               <a:rPr lang="en-US" smtClean="0"/>
-              <a:t>2014-09-17</a:t>
+              <a:t>2021-10-21</a:t>
             </a:fld>
             <a:endParaRPr lang="en-US"/>
           </a:p>
@@ -732,10 +742,9 @@
           <a:lstStyle/>
           <a:p>
             <a:r>
-              <a:rPr lang="en-US" smtClean="0"/>
+              <a:rPr lang="en-US"/>
               <a:t>Click to edit Master title style</a:t>
             </a:r>
-            <a:endParaRPr lang="en-US"/>
           </a:p>
         </p:txBody>
       </p:sp>
@@ -756,38 +765,37 @@
           <a:p>
             <a:pPr lvl="0"/>
             <a:r>
-              <a:rPr lang="en-US" smtClean="0"/>
+              <a:rPr lang="en-US"/>
               <a:t>Click to edit Master text styles</a:t>
             </a:r>
           </a:p>
           <a:p>
             <a:pPr lvl="1"/>
             <a:r>
-              <a:rPr lang="en-US" smtClean="0"/>
+              <a:rPr lang="en-US"/>
               <a:t>Second level</a:t>
             </a:r>
           </a:p>
           <a:p>
             <a:pPr lvl="2"/>
             <a:r>
-              <a:rPr lang="en-US" smtClean="0"/>
+              <a:rPr lang="en-US"/>
               <a:t>Third level</a:t>
             </a:r>
           </a:p>
           <a:p>
             <a:pPr lvl="3"/>
             <a:r>
-              <a:rPr lang="en-US" smtClean="0"/>
+              <a:rPr lang="en-US"/>
               <a:t>Fourth level</a:t>
             </a:r>
           </a:p>
           <a:p>
             <a:pPr lvl="4"/>
             <a:r>
-              <a:rPr lang="en-US" smtClean="0"/>
+              <a:rPr lang="en-US"/>
               <a:t>Fifth level</a:t>
             </a:r>
-            <a:endParaRPr lang="en-US"/>
           </a:p>
         </p:txBody>
       </p:sp>
@@ -808,7 +816,7 @@
           <a:p>
             <a:fld id="{14FDA196-48ED-4C66-A75B-9C39ECF32E0B}" type="datetimeFigureOut">
               <a:rPr lang="en-US" smtClean="0"/>
-              <a:t>2014-09-17</a:t>
+              <a:t>2021-10-21</a:t>
             </a:fld>
             <a:endParaRPr lang="en-US"/>
           </a:p>
@@ -911,10 +919,9 @@
           </a:lstStyle>
           <a:p>
             <a:r>
-              <a:rPr lang="en-US" smtClean="0"/>
+              <a:rPr lang="en-US"/>
               <a:t>Click to edit Master title style</a:t>
             </a:r>
-            <a:endParaRPr lang="en-US"/>
           </a:p>
         </p:txBody>
       </p:sp>
@@ -1031,7 +1038,7 @@
           <a:p>
             <a:pPr lvl="0"/>
             <a:r>
-              <a:rPr lang="en-US" smtClean="0"/>
+              <a:rPr lang="en-US"/>
               <a:t>Click to edit Master text styles</a:t>
             </a:r>
           </a:p>
@@ -1054,7 +1061,7 @@
           <a:p>
             <a:fld id="{14FDA196-48ED-4C66-A75B-9C39ECF32E0B}" type="datetimeFigureOut">
               <a:rPr lang="en-US" smtClean="0"/>
-              <a:t>2014-09-17</a:t>
+              <a:t>2021-10-21</a:t>
             </a:fld>
             <a:endParaRPr lang="en-US"/>
           </a:p>
@@ -1148,10 +1155,9 @@
           <a:lstStyle/>
           <a:p>
             <a:r>
-              <a:rPr lang="en-US" smtClean="0"/>
+              <a:rPr lang="en-US"/>
               <a:t>Click to edit Master title style</a:t>
             </a:r>
-            <a:endParaRPr lang="en-US"/>
           </a:p>
         </p:txBody>
       </p:sp>
@@ -1205,38 +1211,37 @@
           <a:p>
             <a:pPr lvl="0"/>
             <a:r>
-              <a:rPr lang="en-US" smtClean="0"/>
+              <a:rPr lang="en-US"/>
               <a:t>Click to edit Master text styles</a:t>
             </a:r>
           </a:p>
           <a:p>
             <a:pPr lvl="1"/>
             <a:r>
-              <a:rPr lang="en-US" smtClean="0"/>
+              <a:rPr lang="en-US"/>
               <a:t>Second level</a:t>
             </a:r>
           </a:p>
           <a:p>
             <a:pPr lvl="2"/>
             <a:r>
-              <a:rPr lang="en-US" smtClean="0"/>
+              <a:rPr lang="en-US"/>
               <a:t>Third level</a:t>
             </a:r>
           </a:p>
           <a:p>
             <a:pPr lvl="3"/>
             <a:r>
-              <a:rPr lang="en-US" smtClean="0"/>
+              <a:rPr lang="en-US"/>
               <a:t>Fourth level</a:t>
             </a:r>
           </a:p>
           <a:p>
             <a:pPr lvl="4"/>
             <a:r>
-              <a:rPr lang="en-US" smtClean="0"/>
+              <a:rPr lang="en-US"/>
               <a:t>Fifth level</a:t>
             </a:r>
-            <a:endParaRPr lang="en-US"/>
           </a:p>
         </p:txBody>
       </p:sp>
@@ -1290,38 +1295,37 @@
           <a:p>
             <a:pPr lvl="0"/>
             <a:r>
-              <a:rPr lang="en-US" smtClean="0"/>
+              <a:rPr lang="en-US"/>
               <a:t>Click to edit Master text styles</a:t>
             </a:r>
           </a:p>
           <a:p>
             <a:pPr lvl="1"/>
             <a:r>
-              <a:rPr lang="en-US" smtClean="0"/>
+              <a:rPr lang="en-US"/>
               <a:t>Second level</a:t>
             </a:r>
           </a:p>
           <a:p>
             <a:pPr lvl="2"/>
             <a:r>
-              <a:rPr lang="en-US" smtClean="0"/>
+              <a:rPr lang="en-US"/>
               <a:t>Third level</a:t>
             </a:r>
           </a:p>
           <a:p>
             <a:pPr lvl="3"/>
             <a:r>
-              <a:rPr lang="en-US" smtClean="0"/>
+              <a:rPr lang="en-US"/>
               <a:t>Fourth level</a:t>
             </a:r>
           </a:p>
           <a:p>
             <a:pPr lvl="4"/>
             <a:r>
-              <a:rPr lang="en-US" smtClean="0"/>
+              <a:rPr lang="en-US"/>
               <a:t>Fifth level</a:t>
             </a:r>
-            <a:endParaRPr lang="en-US"/>
           </a:p>
         </p:txBody>
       </p:sp>
@@ -1342,7 +1346,7 @@
           <a:p>
             <a:fld id="{14FDA196-48ED-4C66-A75B-9C39ECF32E0B}" type="datetimeFigureOut">
               <a:rPr lang="en-US" smtClean="0"/>
-              <a:t>2014-09-17</a:t>
+              <a:t>2021-10-21</a:t>
             </a:fld>
             <a:endParaRPr lang="en-US"/>
           </a:p>
@@ -1440,10 +1444,9 @@
           </a:lstStyle>
           <a:p>
             <a:r>
-              <a:rPr lang="en-US" smtClean="0"/>
+              <a:rPr lang="en-US"/>
               <a:t>Click to edit Master title style</a:t>
             </a:r>
-            <a:endParaRPr lang="en-US"/>
           </a:p>
         </p:txBody>
       </p:sp>
@@ -1506,7 +1509,7 @@
           <a:p>
             <a:pPr lvl="0"/>
             <a:r>
-              <a:rPr lang="en-US" smtClean="0"/>
+              <a:rPr lang="en-US"/>
               <a:t>Click to edit Master text styles</a:t>
             </a:r>
           </a:p>
@@ -1562,38 +1565,37 @@
           <a:p>
             <a:pPr lvl="0"/>
             <a:r>
-              <a:rPr lang="en-US" smtClean="0"/>
+              <a:rPr lang="en-US"/>
               <a:t>Click to edit Master text styles</a:t>
             </a:r>
           </a:p>
           <a:p>
             <a:pPr lvl="1"/>
             <a:r>
-              <a:rPr lang="en-US" smtClean="0"/>
+              <a:rPr lang="en-US"/>
               <a:t>Second level</a:t>
             </a:r>
           </a:p>
           <a:p>
             <a:pPr lvl="2"/>
             <a:r>
-              <a:rPr lang="en-US" smtClean="0"/>
+              <a:rPr lang="en-US"/>
               <a:t>Third level</a:t>
             </a:r>
           </a:p>
           <a:p>
             <a:pPr lvl="3"/>
             <a:r>
-              <a:rPr lang="en-US" smtClean="0"/>
+              <a:rPr lang="en-US"/>
               <a:t>Fourth level</a:t>
             </a:r>
           </a:p>
           <a:p>
             <a:pPr lvl="4"/>
             <a:r>
-              <a:rPr lang="en-US" smtClean="0"/>
+              <a:rPr lang="en-US"/>
               <a:t>Fifth level</a:t>
             </a:r>
-            <a:endParaRPr lang="en-US"/>
           </a:p>
         </p:txBody>
       </p:sp>
@@ -1656,7 +1658,7 @@
           <a:p>
             <a:pPr lvl="0"/>
             <a:r>
-              <a:rPr lang="en-US" smtClean="0"/>
+              <a:rPr lang="en-US"/>
               <a:t>Click to edit Master text styles</a:t>
             </a:r>
           </a:p>
@@ -1712,38 +1714,37 @@
           <a:p>
             <a:pPr lvl="0"/>
             <a:r>
-              <a:rPr lang="en-US" smtClean="0"/>
+              <a:rPr lang="en-US"/>
               <a:t>Click to edit Master text styles</a:t>
             </a:r>
           </a:p>
           <a:p>
             <a:pPr lvl="1"/>
             <a:r>
-              <a:rPr lang="en-US" smtClean="0"/>
+              <a:rPr lang="en-US"/>
               <a:t>Second level</a:t>
             </a:r>
           </a:p>
           <a:p>
             <a:pPr lvl="2"/>
             <a:r>
-              <a:rPr lang="en-US" smtClean="0"/>
+              <a:rPr lang="en-US"/>
               <a:t>Third level</a:t>
             </a:r>
           </a:p>
           <a:p>
             <a:pPr lvl="3"/>
             <a:r>
-              <a:rPr lang="en-US" smtClean="0"/>
+              <a:rPr lang="en-US"/>
               <a:t>Fourth level</a:t>
             </a:r>
           </a:p>
           <a:p>
             <a:pPr lvl="4"/>
             <a:r>
-              <a:rPr lang="en-US" smtClean="0"/>
+              <a:rPr lang="en-US"/>
               <a:t>Fifth level</a:t>
             </a:r>
-            <a:endParaRPr lang="en-US"/>
           </a:p>
         </p:txBody>
       </p:sp>
@@ -1764,7 +1765,7 @@
           <a:p>
             <a:fld id="{14FDA196-48ED-4C66-A75B-9C39ECF32E0B}" type="datetimeFigureOut">
               <a:rPr lang="en-US" smtClean="0"/>
-              <a:t>2014-09-17</a:t>
+              <a:t>2021-10-21</a:t>
             </a:fld>
             <a:endParaRPr lang="en-US"/>
           </a:p>
@@ -1858,10 +1859,9 @@
           <a:lstStyle/>
           <a:p>
             <a:r>
-              <a:rPr lang="en-US" smtClean="0"/>
+              <a:rPr lang="en-US"/>
               <a:t>Click to edit Master title style</a:t>
             </a:r>
-            <a:endParaRPr lang="en-US"/>
           </a:p>
         </p:txBody>
       </p:sp>
@@ -1882,7 +1882,7 @@
           <a:p>
             <a:fld id="{14FDA196-48ED-4C66-A75B-9C39ECF32E0B}" type="datetimeFigureOut">
               <a:rPr lang="en-US" smtClean="0"/>
-              <a:t>2014-09-17</a:t>
+              <a:t>2021-10-21</a:t>
             </a:fld>
             <a:endParaRPr lang="en-US"/>
           </a:p>
@@ -1977,7 +1977,7 @@
           <a:p>
             <a:fld id="{14FDA196-48ED-4C66-A75B-9C39ECF32E0B}" type="datetimeFigureOut">
               <a:rPr lang="en-US" smtClean="0"/>
-              <a:t>2014-09-17</a:t>
+              <a:t>2021-10-21</a:t>
             </a:fld>
             <a:endParaRPr lang="en-US"/>
           </a:p>
@@ -2080,10 +2080,9 @@
           </a:lstStyle>
           <a:p>
             <a:r>
-              <a:rPr lang="en-US" smtClean="0"/>
+              <a:rPr lang="en-US"/>
               <a:t>Click to edit Master title style</a:t>
             </a:r>
-            <a:endParaRPr lang="en-US"/>
           </a:p>
         </p:txBody>
       </p:sp>
@@ -2137,38 +2136,37 @@
           <a:p>
             <a:pPr lvl="0"/>
             <a:r>
-              <a:rPr lang="en-US" smtClean="0"/>
+              <a:rPr lang="en-US"/>
               <a:t>Click to edit Master text styles</a:t>
             </a:r>
           </a:p>
           <a:p>
             <a:pPr lvl="1"/>
             <a:r>
-              <a:rPr lang="en-US" smtClean="0"/>
+              <a:rPr lang="en-US"/>
               <a:t>Second level</a:t>
             </a:r>
           </a:p>
           <a:p>
             <a:pPr lvl="2"/>
             <a:r>
-              <a:rPr lang="en-US" smtClean="0"/>
+              <a:rPr lang="en-US"/>
               <a:t>Third level</a:t>
             </a:r>
           </a:p>
           <a:p>
             <a:pPr lvl="3"/>
             <a:r>
-              <a:rPr lang="en-US" smtClean="0"/>
+              <a:rPr lang="en-US"/>
               <a:t>Fourth level</a:t>
             </a:r>
           </a:p>
           <a:p>
             <a:pPr lvl="4"/>
             <a:r>
-              <a:rPr lang="en-US" smtClean="0"/>
+              <a:rPr lang="en-US"/>
               <a:t>Fifth level</a:t>
             </a:r>
-            <a:endParaRPr lang="en-US"/>
           </a:p>
         </p:txBody>
       </p:sp>
@@ -2231,7 +2229,7 @@
           <a:p>
             <a:pPr lvl="0"/>
             <a:r>
-              <a:rPr lang="en-US" smtClean="0"/>
+              <a:rPr lang="en-US"/>
               <a:t>Click to edit Master text styles</a:t>
             </a:r>
           </a:p>
@@ -2254,7 +2252,7 @@
           <a:p>
             <a:fld id="{14FDA196-48ED-4C66-A75B-9C39ECF32E0B}" type="datetimeFigureOut">
               <a:rPr lang="en-US" smtClean="0"/>
-              <a:t>2014-09-17</a:t>
+              <a:t>2021-10-21</a:t>
             </a:fld>
             <a:endParaRPr lang="en-US"/>
           </a:p>
@@ -2357,10 +2355,9 @@
           </a:lstStyle>
           <a:p>
             <a:r>
-              <a:rPr lang="en-US" smtClean="0"/>
+              <a:rPr lang="en-US"/>
               <a:t>Click to edit Master title style</a:t>
             </a:r>
-            <a:endParaRPr lang="en-US"/>
           </a:p>
         </p:txBody>
       </p:sp>
@@ -2484,7 +2481,7 @@
           <a:p>
             <a:pPr lvl="0"/>
             <a:r>
-              <a:rPr lang="en-US" smtClean="0"/>
+              <a:rPr lang="en-US"/>
               <a:t>Click to edit Master text styles</a:t>
             </a:r>
           </a:p>
@@ -2507,7 +2504,7 @@
           <a:p>
             <a:fld id="{14FDA196-48ED-4C66-A75B-9C39ECF32E0B}" type="datetimeFigureOut">
               <a:rPr lang="en-US" smtClean="0"/>
-              <a:t>2014-09-17</a:t>
+              <a:t>2021-10-21</a:t>
             </a:fld>
             <a:endParaRPr lang="en-US"/>
           </a:p>
@@ -2616,10 +2613,9 @@
           <a:lstStyle/>
           <a:p>
             <a:r>
-              <a:rPr lang="en-US" smtClean="0"/>
+              <a:rPr lang="en-US"/>
               <a:t>Click to edit Master title style</a:t>
             </a:r>
-            <a:endParaRPr lang="en-US"/>
           </a:p>
         </p:txBody>
       </p:sp>
@@ -2650,38 +2646,37 @@
           <a:p>
             <a:pPr lvl="0"/>
             <a:r>
-              <a:rPr lang="en-US" smtClean="0"/>
+              <a:rPr lang="en-US"/>
               <a:t>Click to edit Master text styles</a:t>
             </a:r>
           </a:p>
           <a:p>
             <a:pPr lvl="1"/>
             <a:r>
-              <a:rPr lang="en-US" smtClean="0"/>
+              <a:rPr lang="en-US"/>
               <a:t>Second level</a:t>
             </a:r>
           </a:p>
           <a:p>
             <a:pPr lvl="2"/>
             <a:r>
-              <a:rPr lang="en-US" smtClean="0"/>
+              <a:rPr lang="en-US"/>
               <a:t>Third level</a:t>
             </a:r>
           </a:p>
           <a:p>
             <a:pPr lvl="3"/>
             <a:r>
-              <a:rPr lang="en-US" smtClean="0"/>
+              <a:rPr lang="en-US"/>
               <a:t>Fourth level</a:t>
             </a:r>
           </a:p>
           <a:p>
             <a:pPr lvl="4"/>
             <a:r>
-              <a:rPr lang="en-US" smtClean="0"/>
+              <a:rPr lang="en-US"/>
               <a:t>Fifth level</a:t>
             </a:r>
-            <a:endParaRPr lang="en-US"/>
           </a:p>
         </p:txBody>
       </p:sp>
@@ -2720,7 +2715,7 @@
           <a:p>
             <a:fld id="{14FDA196-48ED-4C66-A75B-9C39ECF32E0B}" type="datetimeFigureOut">
               <a:rPr lang="en-US" smtClean="0"/>
-              <a:t>2014-09-17</a:t>
+              <a:t>2021-10-21</a:t>
             </a:fld>
             <a:endParaRPr lang="en-US"/>
           </a:p>
@@ -3468,10 +3463,9 @@
           <a:lstStyle/>
           <a:p>
             <a:r>
-              <a:rPr lang="en-US" sz="1000" b="1" i="1" dirty="0" smtClean="0"/>
+              <a:rPr lang="en-US" sz="1000" b="1" i="1" dirty="0"/>
               <a:t>Sequence bands</a:t>
             </a:r>
-            <a:endParaRPr lang="en-US" sz="1000" b="1" i="1" dirty="0"/>
           </a:p>
         </p:txBody>
       </p:sp>
@@ -3498,10 +3492,9 @@
           <a:lstStyle/>
           <a:p>
             <a:r>
-              <a:rPr lang="en-US" sz="1000" b="1" i="1" dirty="0" smtClean="0"/>
+              <a:rPr lang="en-US" sz="1000" b="1" i="1" dirty="0"/>
               <a:t>Regular bands</a:t>
             </a:r>
-            <a:endParaRPr lang="en-US" sz="1000" b="1" i="1" dirty="0"/>
           </a:p>
         </p:txBody>
       </p:sp>
@@ -3528,10 +3521,9 @@
           <a:lstStyle/>
           <a:p>
             <a:r>
-              <a:rPr lang="en-US" sz="1000" b="1" i="1" dirty="0" smtClean="0"/>
+              <a:rPr lang="en-US" sz="1000" b="1" i="1" dirty="0"/>
               <a:t>Hot bands</a:t>
             </a:r>
-            <a:endParaRPr lang="en-US" sz="1000" b="1" i="1" dirty="0"/>
           </a:p>
         </p:txBody>
       </p:sp>
@@ -3774,18 +3766,17 @@
           <a:lstStyle/>
           <a:p>
             <a:r>
-              <a:rPr lang="en-US" sz="1000" dirty="0" smtClean="0"/>
+              <a:rPr lang="en-US" sz="1000" dirty="0"/>
               <a:t>00</a:t>
             </a:r>
             <a:r>
-              <a:rPr lang="en-US" sz="1000" baseline="30000" dirty="0" smtClean="0"/>
+              <a:rPr lang="en-US" sz="1000" baseline="30000" dirty="0"/>
               <a:t>0</a:t>
             </a:r>
             <a:r>
-              <a:rPr lang="en-US" sz="1000" dirty="0" smtClean="0"/>
+              <a:rPr lang="en-US" sz="1000" dirty="0"/>
               <a:t>1</a:t>
             </a:r>
-            <a:endParaRPr lang="en-US" sz="1000" dirty="0"/>
           </a:p>
         </p:txBody>
       </p:sp>
@@ -3812,27 +3803,23 @@
           <a:lstStyle/>
           <a:p>
             <a:r>
-              <a:rPr lang="en-US" sz="1000" dirty="0" smtClean="0"/>
+              <a:rPr lang="en-US" sz="1000" dirty="0"/>
               <a:t>[10</a:t>
             </a:r>
             <a:r>
-              <a:rPr lang="en-US" sz="1000" baseline="30000" dirty="0" smtClean="0"/>
+              <a:rPr lang="en-US" sz="1000" baseline="30000" dirty="0"/>
               <a:t>0</a:t>
             </a:r>
             <a:r>
-              <a:rPr lang="en-US" sz="1000" dirty="0" smtClean="0"/>
-              <a:t>0, </a:t>
-            </a:r>
-            <a:r>
-              <a:rPr lang="en-US" sz="1000" dirty="0" smtClean="0"/>
-              <a:t>02</a:t>
-            </a:r>
-            <a:r>
-              <a:rPr lang="en-US" sz="1000" baseline="30000" dirty="0" smtClean="0"/>
+              <a:rPr lang="en-US" sz="1000" dirty="0"/>
+              <a:t>0, 02</a:t>
+            </a:r>
+            <a:r>
+              <a:rPr lang="en-US" sz="1000" baseline="30000" dirty="0"/>
               <a:t>0</a:t>
             </a:r>
             <a:r>
-              <a:rPr lang="en-US" sz="1000" dirty="0" smtClean="0"/>
+              <a:rPr lang="en-US" sz="1000" dirty="0"/>
               <a:t>0]</a:t>
             </a:r>
             <a:endParaRPr lang="en-US" sz="1000" baseline="-25000" dirty="0"/>
@@ -3862,18 +3849,17 @@
           <a:lstStyle/>
           <a:p>
             <a:r>
-              <a:rPr lang="en-US" sz="1000" dirty="0" smtClean="0"/>
+              <a:rPr lang="en-US" sz="1000" dirty="0"/>
               <a:t>00</a:t>
             </a:r>
             <a:r>
-              <a:rPr lang="en-US" sz="1000" baseline="30000" dirty="0" smtClean="0"/>
+              <a:rPr lang="en-US" sz="1000" baseline="30000" dirty="0"/>
               <a:t>0</a:t>
             </a:r>
             <a:r>
-              <a:rPr lang="en-US" sz="1000" dirty="0" smtClean="0"/>
+              <a:rPr lang="en-US" sz="1000" dirty="0"/>
               <a:t>2</a:t>
             </a:r>
-            <a:endParaRPr lang="en-US" sz="1000" dirty="0"/>
           </a:p>
         </p:txBody>
       </p:sp>
@@ -3900,27 +3886,23 @@
           <a:lstStyle/>
           <a:p>
             <a:r>
-              <a:rPr lang="en-US" sz="1000" dirty="0" smtClean="0"/>
+              <a:rPr lang="en-US" sz="1000" dirty="0"/>
               <a:t>[10</a:t>
             </a:r>
             <a:r>
-              <a:rPr lang="en-US" sz="1000" baseline="30000" dirty="0" smtClean="0"/>
+              <a:rPr lang="en-US" sz="1000" baseline="30000" dirty="0"/>
               <a:t>0</a:t>
             </a:r>
             <a:r>
-              <a:rPr lang="en-US" sz="1000" dirty="0" smtClean="0"/>
-              <a:t>1, </a:t>
-            </a:r>
-            <a:r>
-              <a:rPr lang="en-US" sz="1000" dirty="0" smtClean="0"/>
-              <a:t>02</a:t>
-            </a:r>
-            <a:r>
-              <a:rPr lang="en-US" sz="1000" baseline="30000" dirty="0" smtClean="0"/>
+              <a:rPr lang="en-US" sz="1000" dirty="0"/>
+              <a:t>1, 02</a:t>
+            </a:r>
+            <a:r>
+              <a:rPr lang="en-US" sz="1000" baseline="30000" dirty="0"/>
               <a:t>0</a:t>
             </a:r>
             <a:r>
-              <a:rPr lang="en-US" sz="1000" dirty="0" smtClean="0"/>
+              <a:rPr lang="en-US" sz="1000" dirty="0"/>
               <a:t>1]</a:t>
             </a:r>
             <a:endParaRPr lang="en-US" sz="1000" baseline="-25000" dirty="0"/>
@@ -3950,18 +3932,17 @@
           <a:lstStyle/>
           <a:p>
             <a:r>
-              <a:rPr lang="en-US" sz="1000" dirty="0" smtClean="0"/>
+              <a:rPr lang="en-US" sz="1000" dirty="0"/>
               <a:t>01</a:t>
             </a:r>
             <a:r>
-              <a:rPr lang="en-US" sz="1000" baseline="30000" dirty="0" smtClean="0"/>
+              <a:rPr lang="en-US" sz="1000" baseline="30000" dirty="0"/>
               <a:t>1</a:t>
             </a:r>
             <a:r>
-              <a:rPr lang="en-US" sz="1000" dirty="0" smtClean="0"/>
+              <a:rPr lang="en-US" sz="1000" dirty="0"/>
               <a:t>1</a:t>
             </a:r>
-            <a:endParaRPr lang="en-US" sz="1000" dirty="0"/>
           </a:p>
         </p:txBody>
       </p:sp>
@@ -3988,27 +3969,23 @@
           <a:lstStyle/>
           <a:p>
             <a:r>
-              <a:rPr lang="en-US" sz="1000" dirty="0" smtClean="0"/>
+              <a:rPr lang="en-US" sz="1000" dirty="0"/>
               <a:t>[11</a:t>
             </a:r>
             <a:r>
-              <a:rPr lang="en-US" sz="1000" baseline="30000" dirty="0" smtClean="0"/>
+              <a:rPr lang="en-US" sz="1000" baseline="30000" dirty="0"/>
               <a:t>1</a:t>
             </a:r>
             <a:r>
-              <a:rPr lang="en-US" sz="1000" dirty="0" smtClean="0"/>
-              <a:t>0, </a:t>
-            </a:r>
-            <a:r>
-              <a:rPr lang="en-US" sz="1000" dirty="0" smtClean="0"/>
-              <a:t>03</a:t>
-            </a:r>
-            <a:r>
-              <a:rPr lang="en-US" sz="1000" baseline="30000" dirty="0" smtClean="0"/>
+              <a:rPr lang="en-US" sz="1000" dirty="0"/>
+              <a:t>0, 03</a:t>
+            </a:r>
+            <a:r>
+              <a:rPr lang="en-US" sz="1000" baseline="30000" dirty="0"/>
               <a:t>1</a:t>
             </a:r>
             <a:r>
-              <a:rPr lang="en-US" sz="1000" dirty="0" smtClean="0"/>
+              <a:rPr lang="en-US" sz="1000" dirty="0"/>
               <a:t>0]</a:t>
             </a:r>
             <a:endParaRPr lang="en-US" sz="1000" baseline="-25000" dirty="0"/>
@@ -4038,18 +4015,17 @@
           <a:lstStyle/>
           <a:p>
             <a:r>
-              <a:rPr lang="en-US" sz="1000" dirty="0" smtClean="0"/>
+              <a:rPr lang="en-US" sz="1000" dirty="0"/>
               <a:t>00</a:t>
             </a:r>
             <a:r>
-              <a:rPr lang="en-US" sz="1000" baseline="30000" dirty="0" smtClean="0"/>
+              <a:rPr lang="en-US" sz="1000" baseline="30000" dirty="0"/>
               <a:t>0</a:t>
             </a:r>
             <a:r>
-              <a:rPr lang="en-US" sz="1000" dirty="0" smtClean="0"/>
+              <a:rPr lang="en-US" sz="1000" dirty="0"/>
               <a:t>0</a:t>
             </a:r>
-            <a:endParaRPr lang="en-US" sz="1000" dirty="0"/>
           </a:p>
         </p:txBody>
       </p:sp>
@@ -4132,7 +4108,7 @@
         </p:nvCxnSpPr>
         <p:spPr>
           <a:xfrm>
-            <a:off x="384737" y="2025650"/>
+            <a:off x="384737" y="2496312"/>
             <a:ext cx="60668" cy="0"/>
           </a:xfrm>
           <a:prstGeom prst="line">
@@ -4167,7 +4143,7 @@
         </p:nvCxnSpPr>
         <p:spPr>
           <a:xfrm>
-            <a:off x="384737" y="463550"/>
+            <a:off x="384737" y="320040"/>
             <a:ext cx="60668" cy="0"/>
           </a:xfrm>
           <a:prstGeom prst="line">
@@ -4202,7 +4178,7 @@
         </p:nvCxnSpPr>
         <p:spPr>
           <a:xfrm>
-            <a:off x="384737" y="2806700"/>
+            <a:off x="384737" y="3044952"/>
             <a:ext cx="60668" cy="0"/>
           </a:xfrm>
           <a:prstGeom prst="line">
@@ -4237,7 +4213,7 @@
         </p:nvCxnSpPr>
         <p:spPr>
           <a:xfrm>
-            <a:off x="384737" y="1244600"/>
+            <a:off x="384737" y="1408176"/>
             <a:ext cx="60668" cy="0"/>
           </a:xfrm>
           <a:prstGeom prst="line">
@@ -4272,7 +4248,7 @@
         </p:nvSpPr>
         <p:spPr>
           <a:xfrm>
-            <a:off x="164681" y="3462179"/>
+            <a:off x="169738" y="3454580"/>
             <a:ext cx="250390" cy="246221"/>
           </a:xfrm>
           <a:prstGeom prst="rect">
@@ -4286,11 +4262,11 @@
           </a:bodyPr>
           <a:lstStyle/>
           <a:p>
-            <a:r>
-              <a:rPr lang="en-US" sz="1000" dirty="0" smtClean="0"/>
+            <a:pPr algn="r"/>
+            <a:r>
+              <a:rPr lang="en-US" sz="1000" dirty="0"/>
               <a:t>0</a:t>
             </a:r>
-            <a:endParaRPr lang="en-US" sz="1000" dirty="0"/>
           </a:p>
         </p:txBody>
       </p:sp>
@@ -4302,7 +4278,7 @@
         </p:nvSpPr>
         <p:spPr>
           <a:xfrm>
-            <a:off x="98959" y="2685363"/>
+            <a:off x="104016" y="2911576"/>
             <a:ext cx="316112" cy="246221"/>
           </a:xfrm>
           <a:prstGeom prst="rect">
@@ -4316,11 +4292,11 @@
           </a:bodyPr>
           <a:lstStyle/>
           <a:p>
-            <a:r>
-              <a:rPr lang="en-US" sz="1000" dirty="0" smtClean="0"/>
-              <a:t>50</a:t>
-            </a:r>
-            <a:endParaRPr lang="en-US" sz="1000" dirty="0"/>
+            <a:pPr algn="r"/>
+            <a:r>
+              <a:rPr lang="en-US" sz="1000" dirty="0"/>
+              <a:t>25</a:t>
+            </a:r>
           </a:p>
         </p:txBody>
       </p:sp>
@@ -4332,8 +4308,8 @@
         </p:nvSpPr>
         <p:spPr>
           <a:xfrm>
-            <a:off x="33235" y="1908546"/>
-            <a:ext cx="381836" cy="246221"/>
+            <a:off x="104016" y="2368573"/>
+            <a:ext cx="316112" cy="246221"/>
           </a:xfrm>
           <a:prstGeom prst="rect">
             <a:avLst/>
@@ -4346,11 +4322,11 @@
           </a:bodyPr>
           <a:lstStyle/>
           <a:p>
-            <a:r>
-              <a:rPr lang="en-US" sz="1000" dirty="0" smtClean="0"/>
-              <a:t>100</a:t>
-            </a:r>
-            <a:endParaRPr lang="en-US" sz="1000" dirty="0"/>
+            <a:pPr algn="r"/>
+            <a:r>
+              <a:rPr lang="en-US" sz="1000" dirty="0"/>
+              <a:t>50</a:t>
+            </a:r>
           </a:p>
         </p:txBody>
       </p:sp>
@@ -4362,8 +4338,8 @@
         </p:nvSpPr>
         <p:spPr>
           <a:xfrm>
-            <a:off x="33235" y="1131729"/>
-            <a:ext cx="381836" cy="246221"/>
+            <a:off x="104016" y="1825569"/>
+            <a:ext cx="316112" cy="246221"/>
           </a:xfrm>
           <a:prstGeom prst="rect">
             <a:avLst/>
@@ -4376,11 +4352,11 @@
           </a:bodyPr>
           <a:lstStyle/>
           <a:p>
-            <a:r>
-              <a:rPr lang="en-US" sz="1000" dirty="0" smtClean="0"/>
-              <a:t>150</a:t>
-            </a:r>
-            <a:endParaRPr lang="en-US" sz="1000" dirty="0"/>
+            <a:pPr algn="r"/>
+            <a:r>
+              <a:rPr lang="en-US" sz="1000" dirty="0"/>
+              <a:t>75</a:t>
+            </a:r>
           </a:p>
         </p:txBody>
       </p:sp>
@@ -4392,7 +4368,7 @@
         </p:nvSpPr>
         <p:spPr>
           <a:xfrm>
-            <a:off x="48037" y="340439"/>
+            <a:off x="38292" y="1282566"/>
             <a:ext cx="381836" cy="246221"/>
           </a:xfrm>
           <a:prstGeom prst="rect">
@@ -4406,11 +4382,11 @@
           </a:bodyPr>
           <a:lstStyle/>
           <a:p>
-            <a:r>
-              <a:rPr lang="en-US" sz="1000" dirty="0" smtClean="0"/>
-              <a:t>200</a:t>
-            </a:r>
-            <a:endParaRPr lang="en-US" sz="1000" dirty="0"/>
+            <a:pPr algn="r"/>
+            <a:r>
+              <a:rPr lang="en-US" sz="1000" dirty="0"/>
+              <a:t>100</a:t>
+            </a:r>
           </a:p>
         </p:txBody>
       </p:sp>
@@ -4437,10 +4413,9 @@
           <a:lstStyle/>
           <a:p>
             <a:r>
-              <a:rPr lang="en-US" sz="1200" b="1" dirty="0" smtClean="0"/>
+              <a:rPr lang="en-US" sz="1200" b="1" dirty="0"/>
               <a:t>THz</a:t>
             </a:r>
-            <a:endParaRPr lang="en-US" sz="1200" b="1" dirty="0"/>
           </a:p>
         </p:txBody>
       </p:sp>
@@ -4678,10 +4653,9 @@
           <a:lstStyle/>
           <a:p>
             <a:r>
-              <a:rPr lang="en-US" sz="1000" dirty="0" smtClean="0"/>
+              <a:rPr lang="en-US" sz="1000" dirty="0"/>
               <a:t>0</a:t>
             </a:r>
-            <a:endParaRPr lang="en-US" sz="1000" dirty="0"/>
           </a:p>
         </p:txBody>
       </p:sp>
@@ -4708,10 +4682,9 @@
           <a:lstStyle/>
           <a:p>
             <a:r>
-              <a:rPr lang="en-US" sz="1000" dirty="0" smtClean="0"/>
+              <a:rPr lang="en-US" sz="1000" dirty="0"/>
               <a:t>1000</a:t>
             </a:r>
-            <a:endParaRPr lang="en-US" sz="1000" dirty="0"/>
           </a:p>
         </p:txBody>
       </p:sp>
@@ -4738,10 +4711,9 @@
           <a:lstStyle/>
           <a:p>
             <a:r>
-              <a:rPr lang="en-US" sz="1000" dirty="0" smtClean="0"/>
+              <a:rPr lang="en-US" sz="1000" dirty="0"/>
               <a:t>2000</a:t>
             </a:r>
-            <a:endParaRPr lang="en-US" sz="1000" dirty="0"/>
           </a:p>
         </p:txBody>
       </p:sp>
@@ -4768,10 +4740,9 @@
           <a:lstStyle/>
           <a:p>
             <a:r>
-              <a:rPr lang="en-US" sz="1000" dirty="0" smtClean="0"/>
+              <a:rPr lang="en-US" sz="1000" dirty="0"/>
               <a:t>3000</a:t>
             </a:r>
-            <a:endParaRPr lang="en-US" sz="1000" dirty="0"/>
           </a:p>
         </p:txBody>
       </p:sp>
@@ -4798,10 +4769,9 @@
           <a:lstStyle/>
           <a:p>
             <a:r>
-              <a:rPr lang="en-US" sz="1000" dirty="0" smtClean="0"/>
+              <a:rPr lang="en-US" sz="1000" dirty="0"/>
               <a:t>4000</a:t>
             </a:r>
-            <a:endParaRPr lang="en-US" sz="1000" dirty="0"/>
           </a:p>
         </p:txBody>
       </p:sp>
@@ -4828,14 +4798,13 @@
           <a:lstStyle/>
           <a:p>
             <a:r>
-              <a:rPr lang="en-US" sz="1200" b="1" dirty="0" smtClean="0"/>
+              <a:rPr lang="en-US" sz="1200" b="1" dirty="0"/>
               <a:t>cm</a:t>
             </a:r>
             <a:r>
-              <a:rPr lang="en-US" sz="1200" b="1" baseline="30000" dirty="0" smtClean="0"/>
+              <a:rPr lang="en-US" sz="1200" b="1" baseline="30000" dirty="0"/>
               <a:t>-1</a:t>
             </a:r>
-            <a:endParaRPr lang="en-US" sz="1200" b="1" baseline="30000" dirty="0"/>
           </a:p>
         </p:txBody>
       </p:sp>
@@ -4897,10 +4866,9 @@
           <a:lstStyle/>
           <a:p>
             <a:r>
-              <a:rPr lang="en-US" sz="1000" dirty="0" smtClean="0"/>
+              <a:rPr lang="en-US" sz="1000" dirty="0"/>
               <a:t>5000</a:t>
             </a:r>
-            <a:endParaRPr lang="en-US" sz="1000" dirty="0"/>
           </a:p>
         </p:txBody>
       </p:sp>
@@ -4927,11 +4895,11 @@
           <a:lstStyle/>
           <a:p>
             <a:r>
-              <a:rPr lang="en-US" dirty="0" smtClean="0"/>
+              <a:rPr lang="en-US" dirty="0"/>
               <a:t>10.4 </a:t>
             </a:r>
             <a:r>
-              <a:rPr lang="en-US" dirty="0" smtClean="0">
+              <a:rPr lang="en-US" dirty="0">
                 <a:latin typeface="Calibri"/>
               </a:rPr>
               <a:t>µm</a:t>
@@ -4963,11 +4931,11 @@
           <a:lstStyle/>
           <a:p>
             <a:r>
-              <a:rPr lang="en-US" dirty="0" smtClean="0"/>
+              <a:rPr lang="en-US" dirty="0"/>
               <a:t>9.4 </a:t>
             </a:r>
             <a:r>
-              <a:rPr lang="en-US" dirty="0" smtClean="0">
+              <a:rPr lang="en-US" dirty="0">
                 <a:latin typeface="Calibri"/>
               </a:rPr>
               <a:t>µm</a:t>
@@ -4999,11 +4967,11 @@
           <a:lstStyle/>
           <a:p>
             <a:r>
-              <a:rPr lang="en-US" dirty="0" smtClean="0"/>
+              <a:rPr lang="en-US" dirty="0"/>
               <a:t>10.4 </a:t>
             </a:r>
             <a:r>
-              <a:rPr lang="en-US" dirty="0" smtClean="0">
+              <a:rPr lang="en-US" dirty="0">
                 <a:latin typeface="Calibri"/>
               </a:rPr>
               <a:t>µm</a:t>
@@ -5035,11 +5003,11 @@
           <a:lstStyle/>
           <a:p>
             <a:r>
-              <a:rPr lang="en-US" dirty="0" smtClean="0"/>
+              <a:rPr lang="en-US" dirty="0"/>
               <a:t>9.4 </a:t>
             </a:r>
             <a:r>
-              <a:rPr lang="en-US" dirty="0" smtClean="0">
+              <a:rPr lang="en-US" dirty="0">
                 <a:latin typeface="Calibri"/>
               </a:rPr>
               <a:t>µm</a:t>
@@ -5071,11 +5039,11 @@
           <a:lstStyle/>
           <a:p>
             <a:r>
-              <a:rPr lang="en-US" dirty="0" smtClean="0"/>
+              <a:rPr lang="en-US" dirty="0"/>
               <a:t>10.8 </a:t>
             </a:r>
             <a:r>
-              <a:rPr lang="en-US" dirty="0" smtClean="0">
+              <a:rPr lang="en-US" dirty="0">
                 <a:latin typeface="Calibri"/>
               </a:rPr>
               <a:t>µm</a:t>
@@ -5107,11 +5075,11 @@
           <a:lstStyle/>
           <a:p>
             <a:r>
-              <a:rPr lang="en-US" dirty="0" smtClean="0"/>
+              <a:rPr lang="en-US" dirty="0"/>
               <a:t>9.3 </a:t>
             </a:r>
             <a:r>
-              <a:rPr lang="en-US" dirty="0" smtClean="0">
+              <a:rPr lang="en-US" dirty="0">
                 <a:latin typeface="Calibri"/>
               </a:rPr>
               <a:t>µm</a:t>
@@ -5143,16 +5111,15 @@
           <a:lstStyle/>
           <a:p>
             <a:r>
-              <a:rPr lang="en-US" dirty="0" smtClean="0"/>
+              <a:rPr lang="en-US" dirty="0"/>
               <a:t>I</a:t>
             </a:r>
           </a:p>
           <a:p>
             <a:r>
-              <a:rPr lang="en-US" dirty="0" smtClean="0"/>
+              <a:rPr lang="en-US" dirty="0"/>
               <a:t>II</a:t>
             </a:r>
-            <a:endParaRPr lang="en-US" dirty="0"/>
           </a:p>
         </p:txBody>
       </p:sp>
@@ -5179,16 +5146,15 @@
           <a:lstStyle/>
           <a:p>
             <a:r>
-              <a:rPr lang="en-US" dirty="0" smtClean="0"/>
+              <a:rPr lang="en-US" dirty="0"/>
               <a:t>I</a:t>
             </a:r>
           </a:p>
           <a:p>
             <a:r>
-              <a:rPr lang="en-US" dirty="0" smtClean="0"/>
+              <a:rPr lang="en-US" dirty="0"/>
               <a:t>II</a:t>
             </a:r>
-            <a:endParaRPr lang="en-US" dirty="0"/>
           </a:p>
         </p:txBody>
       </p:sp>
@@ -5215,16 +5181,169 @@
           <a:lstStyle/>
           <a:p>
             <a:r>
-              <a:rPr lang="en-US" dirty="0" smtClean="0"/>
+              <a:rPr lang="en-US" dirty="0"/>
               <a:t>I</a:t>
             </a:r>
           </a:p>
           <a:p>
             <a:r>
-              <a:rPr lang="en-US" dirty="0" smtClean="0"/>
+              <a:rPr lang="en-US" dirty="0"/>
               <a:t>II</a:t>
             </a:r>
-            <a:endParaRPr lang="en-US" dirty="0"/>
+          </a:p>
+        </p:txBody>
+      </p:sp>
+      <p:cxnSp>
+        <p:nvCxnSpPr>
+          <p:cNvPr id="63" name="Straight Connector 62">
+            <a:extLst>
+              <a:ext uri="{FF2B5EF4-FFF2-40B4-BE49-F238E27FC236}">
+                <a16:creationId xmlns:a16="http://schemas.microsoft.com/office/drawing/2014/main" id="{2C5403B4-D959-46D3-BAAE-6AA67A9361A7}"/>
+              </a:ext>
+            </a:extLst>
+          </p:cNvPr>
+          <p:cNvCxnSpPr/>
+          <p:nvPr/>
+        </p:nvCxnSpPr>
+        <p:spPr>
+          <a:xfrm>
+            <a:off x="384048" y="1956816"/>
+            <a:ext cx="60668" cy="0"/>
+          </a:xfrm>
+          <a:prstGeom prst="line">
+            <a:avLst/>
+          </a:prstGeom>
+          <a:ln w="12700">
+            <a:solidFill>
+              <a:schemeClr val="tx1"/>
+            </a:solidFill>
+          </a:ln>
+        </p:spPr>
+        <p:style>
+          <a:lnRef idx="1">
+            <a:schemeClr val="accent1"/>
+          </a:lnRef>
+          <a:fillRef idx="0">
+            <a:schemeClr val="accent1"/>
+          </a:fillRef>
+          <a:effectRef idx="0">
+            <a:schemeClr val="accent1"/>
+          </a:effectRef>
+          <a:fontRef idx="minor">
+            <a:schemeClr val="tx1"/>
+          </a:fontRef>
+        </p:style>
+      </p:cxnSp>
+      <p:cxnSp>
+        <p:nvCxnSpPr>
+          <p:cNvPr id="64" name="Straight Connector 63">
+            <a:extLst>
+              <a:ext uri="{FF2B5EF4-FFF2-40B4-BE49-F238E27FC236}">
+                <a16:creationId xmlns:a16="http://schemas.microsoft.com/office/drawing/2014/main" id="{E311553D-FFAB-4ED6-9972-B0F9141710E1}"/>
+              </a:ext>
+            </a:extLst>
+          </p:cNvPr>
+          <p:cNvCxnSpPr/>
+          <p:nvPr/>
+        </p:nvCxnSpPr>
+        <p:spPr>
+          <a:xfrm>
+            <a:off x="384048" y="868680"/>
+            <a:ext cx="60668" cy="0"/>
+          </a:xfrm>
+          <a:prstGeom prst="line">
+            <a:avLst/>
+          </a:prstGeom>
+          <a:ln w="12700">
+            <a:solidFill>
+              <a:schemeClr val="tx1"/>
+            </a:solidFill>
+          </a:ln>
+        </p:spPr>
+        <p:style>
+          <a:lnRef idx="1">
+            <a:schemeClr val="accent1"/>
+          </a:lnRef>
+          <a:fillRef idx="0">
+            <a:schemeClr val="accent1"/>
+          </a:fillRef>
+          <a:effectRef idx="0">
+            <a:schemeClr val="accent1"/>
+          </a:effectRef>
+          <a:fontRef idx="minor">
+            <a:schemeClr val="tx1"/>
+          </a:fontRef>
+        </p:style>
+      </p:cxnSp>
+      <p:sp>
+        <p:nvSpPr>
+          <p:cNvPr id="65" name="TextBox 64">
+            <a:extLst>
+              <a:ext uri="{FF2B5EF4-FFF2-40B4-BE49-F238E27FC236}">
+                <a16:creationId xmlns:a16="http://schemas.microsoft.com/office/drawing/2014/main" id="{BDA1F89D-B998-4FEE-B127-438425FB0B4E}"/>
+              </a:ext>
+            </a:extLst>
+          </p:cNvPr>
+          <p:cNvSpPr txBox="1"/>
+          <p:nvPr/>
+        </p:nvSpPr>
+        <p:spPr>
+          <a:xfrm>
+            <a:off x="38292" y="739563"/>
+            <a:ext cx="381836" cy="246221"/>
+          </a:xfrm>
+          <a:prstGeom prst="rect">
+            <a:avLst/>
+          </a:prstGeom>
+          <a:noFill/>
+        </p:spPr>
+        <p:txBody>
+          <a:bodyPr wrap="none" rtlCol="0">
+            <a:spAutoFit/>
+          </a:bodyPr>
+          <a:lstStyle/>
+          <a:p>
+            <a:pPr algn="r"/>
+            <a:r>
+              <a:rPr lang="en-US" sz="1000" dirty="0"/>
+              <a:t>125</a:t>
+            </a:r>
+          </a:p>
+        </p:txBody>
+      </p:sp>
+      <p:sp>
+        <p:nvSpPr>
+          <p:cNvPr id="66" name="TextBox 65">
+            <a:extLst>
+              <a:ext uri="{FF2B5EF4-FFF2-40B4-BE49-F238E27FC236}">
+                <a16:creationId xmlns:a16="http://schemas.microsoft.com/office/drawing/2014/main" id="{DB25CBFC-CBBF-4A17-9716-B0661C9D4FE4}"/>
+              </a:ext>
+            </a:extLst>
+          </p:cNvPr>
+          <p:cNvSpPr txBox="1"/>
+          <p:nvPr/>
+        </p:nvSpPr>
+        <p:spPr>
+          <a:xfrm>
+            <a:off x="38292" y="196559"/>
+            <a:ext cx="381836" cy="246221"/>
+          </a:xfrm>
+          <a:prstGeom prst="rect">
+            <a:avLst/>
+          </a:prstGeom>
+          <a:noFill/>
+        </p:spPr>
+        <p:txBody>
+          <a:bodyPr wrap="none" rtlCol="0">
+            <a:spAutoFit/>
+          </a:bodyPr>
+          <a:lstStyle/>
+          <a:p>
+            <a:pPr algn="r"/>
+            <a:r>
+              <a:rPr lang="en-US" sz="1000" dirty="0"/>
+              <a:t>150</a:t>
+            </a:r>
           </a:p>
         </p:txBody>
       </p:sp>

</xml_diff>